<commit_message>
removed some dependecies from package.json
Bootstrap and other dependencies are triggering a warning about vulnerabilities
</commit_message>
<xml_diff>
--- a/Lesson5/Lesson5.pptx
+++ b/Lesson5/Lesson5.pptx
@@ -2378,7 +2378,7 @@
           </a:ln>
           <a:extLst>
             <a:ext uri="{C572A759-6A51-4108-AA02-DFA0A04FC94B}">
-              <ma14:wrappingTextBoxFlag xmlns:ma14="http://schemas.microsoft.com/office/mac/drawingml/2011/main" xmlns="" val="1"/>
+              <ma14:wrappingTextBoxFlag xmlns="" xmlns:ma14="http://schemas.microsoft.com/office/mac/drawingml/2011/main" val="1"/>
             </a:ext>
           </a:extLst>
         </p:spPr>
@@ -2417,7 +2417,7 @@
           </a:ln>
           <a:extLst>
             <a:ext uri="{C572A759-6A51-4108-AA02-DFA0A04FC94B}">
-              <ma14:wrappingTextBoxFlag xmlns:ma14="http://schemas.microsoft.com/office/mac/drawingml/2011/main" xmlns="" val="1"/>
+              <ma14:wrappingTextBoxFlag xmlns="" xmlns:ma14="http://schemas.microsoft.com/office/mac/drawingml/2011/main" val="1"/>
             </a:ext>
           </a:extLst>
         </p:spPr>
@@ -9142,8 +9142,31 @@
                 <a:latin typeface="Calibri" panose="020F0502020204030204" pitchFamily="34" charset="0"/>
                 <a:cs typeface="Calibri" panose="020F0502020204030204" pitchFamily="34" charset="0"/>
               </a:rPr>
-              <a:t>Fetch API is a new native JavaScript API.</a:t>
-            </a:r>
+              <a:t>Fetch API is the native JavaScript API for </a:t>
+            </a:r>
+            <a:r>
+              <a:rPr lang="en-US" sz="2500">
+                <a:solidFill>
+                  <a:schemeClr val="tx1">
+                    <a:lumMod val="85000"/>
+                    <a:lumOff val="15000"/>
+                  </a:schemeClr>
+                </a:solidFill>
+                <a:latin typeface="Calibri" panose="020F0502020204030204" pitchFamily="34" charset="0"/>
+                <a:cs typeface="Calibri" panose="020F0502020204030204" pitchFamily="34" charset="0"/>
+              </a:rPr>
+              <a:t>that purpose</a:t>
+            </a:r>
+            <a:endParaRPr lang="en-US" sz="2500" dirty="0">
+              <a:solidFill>
+                <a:schemeClr val="tx1">
+                  <a:lumMod val="85000"/>
+                  <a:lumOff val="15000"/>
+                </a:schemeClr>
+              </a:solidFill>
+              <a:latin typeface="Calibri" panose="020F0502020204030204" pitchFamily="34" charset="0"/>
+              <a:cs typeface="Calibri" panose="020F0502020204030204" pitchFamily="34" charset="0"/>
+            </a:endParaRPr>
           </a:p>
           <a:p>
             <a:pPr marL="0" indent="0" fontAlgn="base">

</xml_diff>

<commit_message>
Added ef command line tools to csproj
</commit_message>
<xml_diff>
--- a/Lesson5/Lesson5.pptx
+++ b/Lesson5/Lesson5.pptx
@@ -2529,6 +2529,7 @@
     <p:sldLayoutId id="2147483660" r:id="rId12"/>
   </p:sldLayoutIdLst>
   <p:transition spd="med"/>
+  <p:hf sldNum="0" hdr="0" dt="0"/>
   <p:txStyles>
     <p:titleStyle>
       <a:lvl1pPr marL="0" marR="0" indent="0" algn="ctr" defTabSz="584200" rtl="0" latinLnBrk="0">
@@ -3672,14 +3673,14 @@
               <a:buNone/>
             </a:pPr>
             <a:r>
-              <a:rPr lang="en-US" sz="2500" dirty="0" err="1">
+              <a:rPr lang="en-US" sz="2500" dirty="0">
                 <a:solidFill>
                   <a:srgbClr val="0070C0"/>
                 </a:solidFill>
                 <a:latin typeface="Calibri" panose="020F0502020204030204" pitchFamily="34" charset="0"/>
                 <a:cs typeface="Calibri" panose="020F0502020204030204" pitchFamily="34" charset="0"/>
               </a:rPr>
-              <a:t>const</a:t>
+              <a:t>var</a:t>
             </a:r>
             <a:r>
               <a:rPr lang="en-US" sz="2500" dirty="0">
@@ -8057,13 +8058,17 @@
           </p:nvPr>
         </p:nvSpPr>
         <p:spPr>
+          <a:xfrm>
+            <a:off x="952500" y="2059172"/>
+            <a:ext cx="11099800" cy="7440428"/>
+          </a:xfrm>
           <a:prstGeom prst="rect">
             <a:avLst/>
           </a:prstGeom>
         </p:spPr>
         <p:txBody>
           <a:bodyPr>
-            <a:normAutofit fontScale="92500" lnSpcReduction="10000"/>
+            <a:normAutofit/>
           </a:bodyPr>
           <a:lstStyle/>
           <a:p>
@@ -8077,194 +8082,51 @@
               <a:rPr dirty="0"/>
               <a:t>Component Lifecycle: </a:t>
             </a:r>
-          </a:p>
-          <a:p>
-            <a:pPr marL="684529" lvl="1" indent="-342264" defTabSz="449833">
+            <a:endParaRPr lang="en-US" dirty="0"/>
+          </a:p>
+          <a:p>
+            <a:pPr marL="342264" indent="-342264" defTabSz="449833">
               <a:spcBef>
                 <a:spcPts val="3200"/>
               </a:spcBef>
-              <a:defRPr sz="2464"/>
-            </a:pPr>
-            <a:r>
-              <a:rPr dirty="0" err="1">
-                <a:solidFill>
-                  <a:srgbClr val="0070C0"/>
-                </a:solidFill>
-              </a:rPr>
-              <a:t>componentWillMount</a:t>
-            </a:r>
-            <a:r>
-              <a:rPr lang="en-US" dirty="0">
-                <a:solidFill>
-                  <a:schemeClr val="tx1">
-                    <a:lumMod val="85000"/>
-                    <a:lumOff val="15000"/>
-                  </a:schemeClr>
-                </a:solidFill>
-              </a:rPr>
-              <a:t>()</a:t>
-            </a:r>
-            <a:r>
-              <a:rPr dirty="0">
-                <a:solidFill>
-                  <a:schemeClr val="tx1">
-                    <a:lumMod val="85000"/>
-                    <a:lumOff val="15000"/>
-                  </a:schemeClr>
-                </a:solidFill>
-              </a:rPr>
-              <a:t> </a:t>
-            </a:r>
-            <a:r>
-              <a:rPr dirty="0"/>
-              <a:t>–</a:t>
-            </a:r>
-            <a:r>
-              <a:rPr lang="en-US" dirty="0"/>
-              <a:t> </a:t>
-            </a:r>
-            <a:r>
-              <a:rPr dirty="0"/>
-              <a:t>Occur only once (before)</a:t>
-            </a:r>
-          </a:p>
-          <a:p>
-            <a:pPr marL="684529" lvl="1" indent="-342264" defTabSz="449833">
+              <a:defRPr sz="2464" u="sng"/>
+            </a:pPr>
+            <a:endParaRPr lang="en-US" dirty="0"/>
+          </a:p>
+          <a:p>
+            <a:pPr marL="342264" indent="-342264" defTabSz="449833">
               <a:spcBef>
                 <a:spcPts val="3200"/>
               </a:spcBef>
-              <a:defRPr sz="2464"/>
-            </a:pPr>
-            <a:r>
-              <a:rPr dirty="0" err="1">
-                <a:solidFill>
-                  <a:srgbClr val="0070C0"/>
-                </a:solidFill>
-              </a:rPr>
-              <a:t>componentDidMount</a:t>
-            </a:r>
-            <a:r>
-              <a:rPr lang="en-US" dirty="0">
-                <a:solidFill>
-                  <a:schemeClr val="tx1">
-                    <a:lumMod val="85000"/>
-                    <a:lumOff val="15000"/>
-                  </a:schemeClr>
-                </a:solidFill>
-              </a:rPr>
-              <a:t>()</a:t>
-            </a:r>
-            <a:r>
-              <a:rPr dirty="0">
-                <a:solidFill>
-                  <a:srgbClr val="0070C0"/>
-                </a:solidFill>
-              </a:rPr>
-              <a:t> </a:t>
-            </a:r>
-            <a:r>
-              <a:rPr dirty="0"/>
-              <a:t>– </a:t>
-            </a:r>
-            <a:r>
-              <a:rPr lang="en-US" dirty="0"/>
-              <a:t>Occur o</a:t>
-            </a:r>
-            <a:r>
-              <a:rPr dirty="0"/>
-              <a:t>nly once (after)</a:t>
-            </a:r>
-          </a:p>
-          <a:p>
-            <a:pPr marL="684529" lvl="1" indent="-342264" defTabSz="449833">
+              <a:defRPr sz="2464" u="sng"/>
+            </a:pPr>
+            <a:endParaRPr lang="en-US" dirty="0"/>
+          </a:p>
+          <a:p>
+            <a:pPr marL="342264" indent="-342264" defTabSz="449833">
               <a:spcBef>
                 <a:spcPts val="3200"/>
               </a:spcBef>
-              <a:defRPr sz="2464"/>
-            </a:pPr>
-            <a:r>
-              <a:rPr dirty="0" err="1">
-                <a:solidFill>
-                  <a:srgbClr val="0070C0"/>
-                </a:solidFill>
-              </a:rPr>
-              <a:t>shouldComponentUpdate</a:t>
-            </a:r>
-            <a:r>
-              <a:rPr lang="en-US" dirty="0">
-                <a:solidFill>
-                  <a:schemeClr val="tx1">
-                    <a:lumMod val="85000"/>
-                    <a:lumOff val="15000"/>
-                  </a:schemeClr>
-                </a:solidFill>
-              </a:rPr>
-              <a:t>()</a:t>
-            </a:r>
-            <a:r>
-              <a:rPr dirty="0">
-                <a:solidFill>
-                  <a:srgbClr val="0070C0"/>
-                </a:solidFill>
-              </a:rPr>
-              <a:t> </a:t>
-            </a:r>
-            <a:r>
-              <a:rPr dirty="0"/>
-              <a:t>– Return value determines weather component should update</a:t>
-            </a:r>
-          </a:p>
-          <a:p>
-            <a:pPr marL="684529" lvl="1" indent="-342264" defTabSz="449833">
+              <a:defRPr sz="2464" u="sng"/>
+            </a:pPr>
+            <a:endParaRPr lang="en-US" dirty="0"/>
+          </a:p>
+          <a:p>
+            <a:pPr marL="342264" indent="-342264" defTabSz="449833">
               <a:spcBef>
                 <a:spcPts val="3200"/>
               </a:spcBef>
-              <a:defRPr sz="2464"/>
-            </a:pPr>
-            <a:r>
-              <a:rPr dirty="0" err="1">
-                <a:solidFill>
-                  <a:srgbClr val="0070C0"/>
-                </a:solidFill>
-              </a:rPr>
-              <a:t>componentWillUnmount</a:t>
-            </a:r>
-            <a:r>
-              <a:rPr lang="en-US" dirty="0">
-                <a:solidFill>
-                  <a:schemeClr val="tx1">
-                    <a:lumMod val="85000"/>
-                    <a:lumOff val="15000"/>
-                  </a:schemeClr>
-                </a:solidFill>
-              </a:rPr>
-              <a:t>()</a:t>
-            </a:r>
-            <a:r>
-              <a:rPr dirty="0">
-                <a:solidFill>
-                  <a:srgbClr val="0070C0"/>
-                </a:solidFill>
-              </a:rPr>
-              <a:t> </a:t>
-            </a:r>
-            <a:r>
-              <a:rPr dirty="0"/>
-              <a:t>– Before unmounting component</a:t>
-            </a:r>
+              <a:defRPr sz="2464" u="sng"/>
+            </a:pPr>
             <a:endParaRPr lang="en-US" dirty="0"/>
           </a:p>
           <a:p>
-            <a:pPr marL="684529" lvl="1" indent="-342264" defTabSz="449833">
+            <a:pPr marL="342264" indent="-342264" defTabSz="449833">
               <a:spcBef>
                 <a:spcPts val="3200"/>
               </a:spcBef>
-              <a:defRPr sz="2464"/>
-            </a:pPr>
-            <a:r>
-              <a:rPr lang="en-US" dirty="0"/>
-              <a:t>Others</a:t>
-            </a:r>
+              <a:defRPr sz="2464" u="sng"/>
+            </a:pPr>
             <a:endParaRPr dirty="0"/>
           </a:p>
           <a:p>
@@ -8297,6 +8159,53 @@
           </a:p>
         </p:txBody>
       </p:sp>
+      <p:pic>
+        <p:nvPicPr>
+          <p:cNvPr id="1026" name="Picture 2" descr="Afbeeldingsresultaat voor lifecycle methods in react">
+            <a:extLst>
+              <a:ext uri="{FF2B5EF4-FFF2-40B4-BE49-F238E27FC236}">
+                <a16:creationId xmlns:a16="http://schemas.microsoft.com/office/drawing/2014/main" id="{F4DCCA01-7F74-2644-B30B-6461F9D8F155}"/>
+              </a:ext>
+            </a:extLst>
+          </p:cNvPr>
+          <p:cNvPicPr>
+            <a:picLocks noChangeAspect="1" noChangeArrowheads="1"/>
+          </p:cNvPicPr>
+          <p:nvPr/>
+        </p:nvPicPr>
+        <p:blipFill>
+          <a:blip r:embed="rId2">
+            <a:extLst>
+              <a:ext uri="{28A0092B-C50C-407E-A947-70E740481C1C}">
+                <a14:useLocalDpi xmlns:a14="http://schemas.microsoft.com/office/drawing/2010/main" val="0"/>
+              </a:ext>
+            </a:extLst>
+          </a:blip>
+          <a:srcRect/>
+          <a:stretch>
+            <a:fillRect/>
+          </a:stretch>
+        </p:blipFill>
+        <p:spPr bwMode="auto">
+          <a:xfrm>
+            <a:off x="1871624" y="3065147"/>
+            <a:ext cx="8037920" cy="4219240"/>
+          </a:xfrm>
+          <a:prstGeom prst="rect">
+            <a:avLst/>
+          </a:prstGeom>
+          <a:noFill/>
+          <a:extLst>
+            <a:ext uri="{909E8E84-426E-40DD-AFC4-6F175D3DCCD1}">
+              <a14:hiddenFill xmlns:a14="http://schemas.microsoft.com/office/drawing/2010/main">
+                <a:solidFill>
+                  <a:srgbClr val="FFFFFF"/>
+                </a:solidFill>
+              </a14:hiddenFill>
+            </a:ext>
+          </a:extLst>
+        </p:spPr>
+      </p:pic>
     </p:spTree>
     <p:extLst>
       <p:ext uri="{BB962C8B-B14F-4D97-AF65-F5344CB8AC3E}">
@@ -8566,7 +8475,7 @@
                 <a:latin typeface="Calibri" panose="020F0502020204030204" pitchFamily="34" charset="0"/>
                 <a:cs typeface="Calibri" panose="020F0502020204030204" pitchFamily="34" charset="0"/>
               </a:rPr>
-              <a:t>		Server sends a new HTML page for each unique path</a:t>
+              <a:t>		Server sends a new HTML page for each unique path. Data binding happens at 		the server-side</a:t>
             </a:r>
           </a:p>
           <a:p>
@@ -8601,7 +8510,7 @@
                 <a:latin typeface="Calibri" panose="020F0502020204030204" pitchFamily="34" charset="0"/>
                 <a:cs typeface="Calibri" panose="020F0502020204030204" pitchFamily="34" charset="0"/>
               </a:rPr>
-              <a:t>Server sends the exact same web page for every unique path (and the page runs JS to change what it look like)</a:t>
+              <a:t>Server sends the exact same web page for every unique path (and the page runs JS to change what it look like). Data binding happens at the client-side</a:t>
             </a:r>
           </a:p>
           <a:p>
@@ -8909,7 +8818,7 @@
                 <a:latin typeface="Calibri" panose="020F0502020204030204" pitchFamily="34" charset="0"/>
                 <a:cs typeface="Calibri" panose="020F0502020204030204" pitchFamily="34" charset="0"/>
               </a:rPr>
-              <a:t>You embed all your views into </a:t>
+              <a:t>You embed all your views into one HTML page. For example: </a:t>
             </a:r>
             <a:r>
               <a:rPr lang="en-US" sz="2500" dirty="0" err="1">
@@ -10012,11 +9921,11 @@
                 <a:latin typeface="Calibri" panose="020F0502020204030204" pitchFamily="34" charset="0"/>
                 <a:cs typeface="Calibri" panose="020F0502020204030204" pitchFamily="34" charset="0"/>
               </a:rPr>
-              <a:t>The Fetch API is made up of one function, and its syntax is easy to use:</a:t>
-            </a:r>
-          </a:p>
-          <a:p>
-            <a:pPr marL="0" indent="0" fontAlgn="base">
+              <a:t>The Fetch API is made up of one function: </a:t>
+            </a:r>
+          </a:p>
+          <a:p>
+            <a:pPr marL="889000" lvl="2" indent="0" fontAlgn="base">
               <a:lnSpc>
                 <a:spcPct val="150000"/>
               </a:lnSpc>
@@ -10025,6 +9934,16 @@
               </a:spcBef>
               <a:buNone/>
             </a:pPr>
+            <a:r>
+              <a:rPr lang="en-US" sz="2500" dirty="0">
+                <a:solidFill>
+                  <a:srgbClr val="0070C0"/>
+                </a:solidFill>
+                <a:latin typeface="Calibri" panose="020F0502020204030204" pitchFamily="34" charset="0"/>
+                <a:cs typeface="Calibri" panose="020F0502020204030204" pitchFamily="34" charset="0"/>
+              </a:rPr>
+              <a:t>fetch</a:t>
+            </a:r>
             <a:r>
               <a:rPr lang="en-US" sz="2500" dirty="0">
                 <a:solidFill>
@@ -10036,17 +9955,37 @@
                 <a:latin typeface="Calibri" panose="020F0502020204030204" pitchFamily="34" charset="0"/>
                 <a:cs typeface="Calibri" panose="020F0502020204030204" pitchFamily="34" charset="0"/>
               </a:rPr>
-              <a:t>		</a:t>
-            </a:r>
-            <a:r>
-              <a:rPr lang="en-US" sz="2500" dirty="0">
-                <a:solidFill>
-                  <a:srgbClr val="0070C0"/>
-                </a:solidFill>
-                <a:latin typeface="Calibri" panose="020F0502020204030204" pitchFamily="34" charset="0"/>
-                <a:cs typeface="Calibri" panose="020F0502020204030204" pitchFamily="34" charset="0"/>
-              </a:rPr>
-              <a:t>fetch</a:t>
+              <a:t>( </a:t>
+            </a:r>
+            <a:r>
+              <a:rPr lang="en-US" sz="2500" dirty="0">
+                <a:solidFill>
+                  <a:srgbClr val="FFC000"/>
+                </a:solidFill>
+                <a:latin typeface="Calibri" panose="020F0502020204030204" pitchFamily="34" charset="0"/>
+                <a:cs typeface="Calibri" panose="020F0502020204030204" pitchFamily="34" charset="0"/>
+              </a:rPr>
+              <a:t>“</a:t>
+            </a:r>
+            <a:r>
+              <a:rPr lang="en-US" sz="2500" dirty="0" err="1">
+                <a:solidFill>
+                  <a:srgbClr val="FFC000"/>
+                </a:solidFill>
+                <a:latin typeface="Calibri" panose="020F0502020204030204" pitchFamily="34" charset="0"/>
+                <a:cs typeface="Calibri" panose="020F0502020204030204" pitchFamily="34" charset="0"/>
+              </a:rPr>
+              <a:t>data.txt</a:t>
+            </a:r>
+            <a:r>
+              <a:rPr lang="en-US" sz="2500" dirty="0">
+                <a:solidFill>
+                  <a:srgbClr val="FFC000"/>
+                </a:solidFill>
+                <a:latin typeface="Calibri" panose="020F0502020204030204" pitchFamily="34" charset="0"/>
+                <a:cs typeface="Calibri" panose="020F0502020204030204" pitchFamily="34" charset="0"/>
+              </a:rPr>
+              <a:t>” </a:t>
             </a:r>
             <a:r>
               <a:rPr lang="en-US" sz="2500" dirty="0">
@@ -10059,38 +9998,20 @@
                 <a:latin typeface="Calibri" panose="020F0502020204030204" pitchFamily="34" charset="0"/>
                 <a:cs typeface="Calibri" panose="020F0502020204030204" pitchFamily="34" charset="0"/>
               </a:rPr>
-              <a:t>( </a:t>
-            </a:r>
-            <a:r>
-              <a:rPr lang="en-US" sz="2500" dirty="0">
-                <a:solidFill>
-                  <a:srgbClr val="FFC000"/>
-                </a:solidFill>
-                <a:latin typeface="Calibri" panose="020F0502020204030204" pitchFamily="34" charset="0"/>
-                <a:cs typeface="Calibri" panose="020F0502020204030204" pitchFamily="34" charset="0"/>
-              </a:rPr>
-              <a:t>“</a:t>
-            </a:r>
-            <a:r>
-              <a:rPr lang="en-US" sz="2500" dirty="0" err="1">
-                <a:solidFill>
-                  <a:srgbClr val="FFC000"/>
-                </a:solidFill>
-                <a:latin typeface="Calibri" panose="020F0502020204030204" pitchFamily="34" charset="0"/>
-                <a:cs typeface="Calibri" panose="020F0502020204030204" pitchFamily="34" charset="0"/>
-              </a:rPr>
-              <a:t>data.txt</a:t>
-            </a:r>
-            <a:r>
-              <a:rPr lang="en-US" sz="2500" dirty="0">
-                <a:solidFill>
-                  <a:srgbClr val="FFC000"/>
-                </a:solidFill>
-                <a:latin typeface="Calibri" panose="020F0502020204030204" pitchFamily="34" charset="0"/>
-                <a:cs typeface="Calibri" panose="020F0502020204030204" pitchFamily="34" charset="0"/>
-              </a:rPr>
-              <a:t>” </a:t>
-            </a:r>
+              <a:t>);</a:t>
+            </a:r>
+          </a:p>
+          <a:p>
+            <a:pPr lvl="2" fontAlgn="base">
+              <a:lnSpc>
+                <a:spcPct val="150000"/>
+              </a:lnSpc>
+              <a:spcBef>
+                <a:spcPts val="0"/>
+              </a:spcBef>
+              <a:buFontTx/>
+              <a:buChar char="-"/>
+            </a:pPr>
             <a:r>
               <a:rPr lang="en-US" sz="2500" dirty="0">
                 <a:solidFill>
@@ -10102,7 +10023,7 @@
                 <a:latin typeface="Calibri" panose="020F0502020204030204" pitchFamily="34" charset="0"/>
                 <a:cs typeface="Calibri" panose="020F0502020204030204" pitchFamily="34" charset="0"/>
               </a:rPr>
-              <a:t>);</a:t>
+              <a:t>The fetch() method takes the string path to the resource you want to fetch as a parameter</a:t>
             </a:r>
           </a:p>
           <a:p>
@@ -10113,8 +10034,8 @@
               <a:spcBef>
                 <a:spcPts val="0"/>
               </a:spcBef>
-              <a:buFont typeface="Arial" panose="020B0604020202020204" pitchFamily="34" charset="0"/>
-              <a:buChar char="•"/>
+              <a:buFontTx/>
+              <a:buChar char="-"/>
             </a:pPr>
             <a:r>
               <a:rPr lang="en-US" sz="2500" dirty="0">
@@ -10127,7 +10048,7 @@
                 <a:latin typeface="Calibri" panose="020F0502020204030204" pitchFamily="34" charset="0"/>
                 <a:cs typeface="Calibri" panose="020F0502020204030204" pitchFamily="34" charset="0"/>
               </a:rPr>
-              <a:t>The fetch() method takes the string path to the resource you want to fetch as a parameter</a:t>
+              <a:t>Additional header information for the requests are optional </a:t>
             </a:r>
           </a:p>
           <a:p>
@@ -10138,33 +10059,8 @@
               <a:spcBef>
                 <a:spcPts val="0"/>
               </a:spcBef>
-              <a:buFont typeface="Arial" panose="020B0604020202020204" pitchFamily="34" charset="0"/>
-              <a:buChar char="•"/>
-            </a:pPr>
-            <a:r>
-              <a:rPr lang="en-US" sz="2500" dirty="0">
-                <a:solidFill>
-                  <a:schemeClr val="tx1">
-                    <a:lumMod val="85000"/>
-                    <a:lumOff val="15000"/>
-                  </a:schemeClr>
-                </a:solidFill>
-                <a:latin typeface="Calibri" panose="020F0502020204030204" pitchFamily="34" charset="0"/>
-                <a:cs typeface="Calibri" panose="020F0502020204030204" pitchFamily="34" charset="0"/>
-              </a:rPr>
-              <a:t>Additional header information for the requests are optional </a:t>
-            </a:r>
-          </a:p>
-          <a:p>
-            <a:pPr lvl="2" fontAlgn="base">
-              <a:lnSpc>
-                <a:spcPct val="150000"/>
-              </a:lnSpc>
-              <a:spcBef>
-                <a:spcPts val="0"/>
-              </a:spcBef>
-              <a:buFont typeface="Arial" panose="020B0604020202020204" pitchFamily="34" charset="0"/>
-              <a:buChar char="•"/>
+              <a:buFontTx/>
+              <a:buChar char="-"/>
             </a:pPr>
             <a:r>
               <a:rPr lang="en-US" sz="2500" dirty="0">
@@ -10317,7 +10213,7 @@
         <p:spPr>
           <a:xfrm>
             <a:off x="952500" y="2274186"/>
-            <a:ext cx="11099800" cy="6908800"/>
+            <a:ext cx="11099800" cy="6423247"/>
           </a:xfrm>
           <a:prstGeom prst="rect">
             <a:avLst/>
@@ -10423,7 +10319,7 @@
                 <a:latin typeface="Calibri" panose="020F0502020204030204" pitchFamily="34" charset="0"/>
                 <a:cs typeface="Calibri" panose="020F0502020204030204" pitchFamily="34" charset="0"/>
               </a:rPr>
-              <a:t>() method that lets you attach functions to execute </a:t>
+              <a:t>() method that lets you attach functions to execute code on </a:t>
             </a:r>
             <a:r>
               <a:rPr lang="en-US" sz="2500" dirty="0" err="1">
@@ -10436,7 +10332,7 @@
                 <a:latin typeface="Calibri" panose="020F0502020204030204" pitchFamily="34" charset="0"/>
                 <a:cs typeface="Calibri" panose="020F0502020204030204" pitchFamily="34" charset="0"/>
               </a:rPr>
-              <a:t>onSuccess</a:t>
+              <a:t>su</a:t>
             </a:r>
             <a:r>
               <a:rPr lang="en-US" sz="2500" dirty="0">
@@ -10945,63 +10841,11 @@
           </a:p>
           <a:p>
             <a:pPr marL="0" indent="0" fontAlgn="base">
-              <a:lnSpc>
-                <a:spcPct val="150000"/>
-              </a:lnSpc>
               <a:spcBef>
                 <a:spcPts val="0"/>
               </a:spcBef>
               <a:buNone/>
             </a:pPr>
-            <a:r>
-              <a:rPr lang="en-US" sz="2500" b="1" dirty="0">
-                <a:solidFill>
-                  <a:schemeClr val="tx1">
-                    <a:lumMod val="85000"/>
-                    <a:lumOff val="15000"/>
-                  </a:schemeClr>
-                </a:solidFill>
-                <a:latin typeface="Calibri" panose="020F0502020204030204" pitchFamily="34" charset="0"/>
-                <a:cs typeface="Calibri" panose="020F0502020204030204" pitchFamily="34" charset="0"/>
-              </a:rPr>
-              <a:t>Note</a:t>
-            </a:r>
-            <a:r>
-              <a:rPr lang="en-US" sz="2500" dirty="0">
-                <a:solidFill>
-                  <a:schemeClr val="tx1">
-                    <a:lumMod val="85000"/>
-                    <a:lumOff val="15000"/>
-                  </a:schemeClr>
-                </a:solidFill>
-                <a:latin typeface="Calibri" panose="020F0502020204030204" pitchFamily="34" charset="0"/>
-                <a:cs typeface="Calibri" panose="020F0502020204030204" pitchFamily="34" charset="0"/>
-              </a:rPr>
-              <a:t>: type declaration is removed to simplify the example</a:t>
-            </a:r>
-          </a:p>
-          <a:p>
-            <a:pPr marL="0" indent="0" fontAlgn="base">
-              <a:lnSpc>
-                <a:spcPct val="150000"/>
-              </a:lnSpc>
-              <a:spcBef>
-                <a:spcPts val="0"/>
-              </a:spcBef>
-              <a:buNone/>
-            </a:pPr>
-            <a:br>
-              <a:rPr lang="en-US" sz="2500" dirty="0">
-                <a:solidFill>
-                  <a:schemeClr val="tx1">
-                    <a:lumMod val="85000"/>
-                    <a:lumOff val="15000"/>
-                  </a:schemeClr>
-                </a:solidFill>
-                <a:latin typeface="Calibri" panose="020F0502020204030204" pitchFamily="34" charset="0"/>
-                <a:cs typeface="Calibri" panose="020F0502020204030204" pitchFamily="34" charset="0"/>
-              </a:rPr>
-            </a:br>
             <a:endParaRPr lang="en-US" sz="2500" dirty="0">
               <a:solidFill>
                 <a:schemeClr val="tx1">
@@ -11012,6 +10856,40 @@
               <a:latin typeface="Calibri" panose="020F0502020204030204" pitchFamily="34" charset="0"/>
               <a:cs typeface="Calibri" panose="020F0502020204030204" pitchFamily="34" charset="0"/>
             </a:endParaRPr>
+          </a:p>
+          <a:p>
+            <a:pPr marL="0" indent="0" fontAlgn="base">
+              <a:spcBef>
+                <a:spcPts val="0"/>
+              </a:spcBef>
+              <a:buNone/>
+            </a:pPr>
+            <a:r>
+              <a:rPr lang="en-US" sz="2500" b="1" dirty="0">
+                <a:solidFill>
+                  <a:schemeClr val="tx1">
+                    <a:lumMod val="85000"/>
+                    <a:lumOff val="15000"/>
+                  </a:schemeClr>
+                </a:solidFill>
+                <a:latin typeface="Calibri" panose="020F0502020204030204" pitchFamily="34" charset="0"/>
+                <a:cs typeface="Calibri" panose="020F0502020204030204" pitchFamily="34" charset="0"/>
+              </a:rPr>
+              <a:t>Note</a:t>
+            </a:r>
+            <a:r>
+              <a:rPr lang="en-US" sz="2500" dirty="0">
+                <a:solidFill>
+                  <a:schemeClr val="tx1">
+                    <a:lumMod val="85000"/>
+                    <a:lumOff val="15000"/>
+                  </a:schemeClr>
+                </a:solidFill>
+                <a:latin typeface="Calibri" panose="020F0502020204030204" pitchFamily="34" charset="0"/>
+                <a:cs typeface="Calibri" panose="020F0502020204030204" pitchFamily="34" charset="0"/>
+              </a:rPr>
+              <a:t>: type declaration is removed to simplify the example</a:t>
+            </a:r>
           </a:p>
         </p:txBody>
       </p:sp>

</xml_diff>